<commit_message>
Day 2 and Day 4
</commit_message>
<xml_diff>
--- a/Business Continuity and Resiliency.pptx
+++ b/Business Continuity and Resiliency.pptx
@@ -26178,8 +26178,14 @@
           <a:p>
             <a:r>
               <a:rPr lang="en-US" dirty="0"/>
-              <a:t>Ethical Hacking - Learning</a:t>
+              <a:t>Ethical </a:t>
             </a:r>
+            <a:r>
+              <a:rPr lang="en-US"/>
+              <a:t>Hacking – Learning</a:t>
+            </a:r>
+          </a:p>
+          <a:p>
             <a:endParaRPr lang="en-IN" dirty="0"/>
           </a:p>
         </p:txBody>

</xml_diff>